<commit_message>
Add figure about POM and new references in 4_Parameter.pptx
</commit_message>
<xml_diff>
--- a/docs/slides/4_Parameter.pptx
+++ b/docs/slides/4_Parameter.pptx
@@ -17,8 +17,10 @@
     <p:sldId id="473" r:id="rId11"/>
     <p:sldId id="526" r:id="rId12"/>
     <p:sldId id="474" r:id="rId13"/>
-    <p:sldId id="527" r:id="rId14"/>
-    <p:sldId id="524" r:id="rId15"/>
+    <p:sldId id="528" r:id="rId14"/>
+    <p:sldId id="529" r:id="rId15"/>
+    <p:sldId id="527" r:id="rId16"/>
+    <p:sldId id="524" r:id="rId17"/>
   </p:sldIdLst>
   <p:sldSz cx="12192000" cy="6858000"/>
   <p:notesSz cx="6858000" cy="9144000"/>
@@ -119,7 +121,18 @@
   </p:defaultTextStyle>
   <p:extLst>
     <p:ext uri="{EFAFB233-063F-42B5-8137-9DF3F51BA10A}">
-      <p15:sldGuideLst xmlns:p15="http://schemas.microsoft.com/office/powerpoint/2012/main" xmlns=""/>
+      <p15:sldGuideLst xmlns:p15="http://schemas.microsoft.com/office/powerpoint/2012/main">
+        <p15:guide id="1" orient="horz" pos="2160">
+          <p15:clr>
+            <a:srgbClr val="A4A3A4"/>
+          </p15:clr>
+        </p15:guide>
+        <p15:guide id="2" pos="3840">
+          <p15:clr>
+            <a:srgbClr val="A4A3A4"/>
+          </p15:clr>
+        </p15:guide>
+      </p15:sldGuideLst>
     </p:ext>
   </p:extLst>
 </p:presentation>
@@ -848,7 +861,7 @@
             <a:fld id="{B61BEF0D-F0BB-DE4B-95CE-6DB70DBA9567}" type="datetimeFigureOut">
               <a:rPr lang="en-US" dirty="0"/>
               <a:pPr/>
-              <a:t>4/27/2021</a:t>
+              <a:t>5/17/2021</a:t>
             </a:fld>
             <a:endParaRPr lang="en-US" dirty="0"/>
           </a:p>
@@ -1096,7 +1109,7 @@
             <a:fld id="{B61BEF0D-F0BB-DE4B-95CE-6DB70DBA9567}" type="datetimeFigureOut">
               <a:rPr lang="en-US" dirty="0"/>
               <a:pPr/>
-              <a:t>4/27/2021</a:t>
+              <a:t>5/17/2021</a:t>
             </a:fld>
             <a:endParaRPr lang="en-US" dirty="0"/>
           </a:p>
@@ -1407,7 +1420,7 @@
             <a:fld id="{B61BEF0D-F0BB-DE4B-95CE-6DB70DBA9567}" type="datetimeFigureOut">
               <a:rPr lang="en-US" dirty="0"/>
               <a:pPr/>
-              <a:t>4/27/2021</a:t>
+              <a:t>5/17/2021</a:t>
             </a:fld>
             <a:endParaRPr lang="en-US" dirty="0"/>
           </a:p>
@@ -1745,7 +1758,7 @@
             <a:fld id="{B61BEF0D-F0BB-DE4B-95CE-6DB70DBA9567}" type="datetimeFigureOut">
               <a:rPr lang="en-US" dirty="0"/>
               <a:pPr/>
-              <a:t>4/27/2021</a:t>
+              <a:t>5/17/2021</a:t>
             </a:fld>
             <a:endParaRPr lang="en-US" dirty="0"/>
           </a:p>
@@ -2056,7 +2069,7 @@
             <a:fld id="{B61BEF0D-F0BB-DE4B-95CE-6DB70DBA9567}" type="datetimeFigureOut">
               <a:rPr lang="en-US" dirty="0"/>
               <a:pPr/>
-              <a:t>4/27/2021</a:t>
+              <a:t>5/17/2021</a:t>
             </a:fld>
             <a:endParaRPr lang="en-US" dirty="0"/>
           </a:p>
@@ -2446,7 +2459,7 @@
             <a:fld id="{B61BEF0D-F0BB-DE4B-95CE-6DB70DBA9567}" type="datetimeFigureOut">
               <a:rPr lang="en-US" dirty="0"/>
               <a:pPr/>
-              <a:t>4/27/2021</a:t>
+              <a:t>5/17/2021</a:t>
             </a:fld>
             <a:endParaRPr lang="en-US" dirty="0"/>
           </a:p>
@@ -2612,7 +2625,7 @@
           <a:p>
             <a:fld id="{55C6B4A9-1611-4792-9094-5F34BCA07E0B}" type="datetimeFigureOut">
               <a:rPr lang="en-US" dirty="0"/>
-              <a:t>4/27/2021</a:t>
+              <a:t>5/17/2021</a:t>
             </a:fld>
             <a:endParaRPr lang="en-US" dirty="0"/>
           </a:p>
@@ -2788,7 +2801,7 @@
             <a:fld id="{B61BEF0D-F0BB-DE4B-95CE-6DB70DBA9567}" type="datetimeFigureOut">
               <a:rPr lang="en-US" dirty="0"/>
               <a:pPr/>
-              <a:t>4/27/2021</a:t>
+              <a:t>5/17/2021</a:t>
             </a:fld>
             <a:endParaRPr lang="en-US" dirty="0"/>
           </a:p>
@@ -2961,7 +2974,7 @@
             <a:fld id="{B61BEF0D-F0BB-DE4B-95CE-6DB70DBA9567}" type="datetimeFigureOut">
               <a:rPr lang="en-US" dirty="0"/>
               <a:pPr/>
-              <a:t>4/27/2021</a:t>
+              <a:t>5/17/2021</a:t>
             </a:fld>
             <a:endParaRPr lang="en-US" dirty="0"/>
           </a:p>
@@ -3205,7 +3218,7 @@
             <a:fld id="{B61BEF0D-F0BB-DE4B-95CE-6DB70DBA9567}" type="datetimeFigureOut">
               <a:rPr lang="en-US" dirty="0"/>
               <a:pPr/>
-              <a:t>4/27/2021</a:t>
+              <a:t>5/17/2021</a:t>
             </a:fld>
             <a:endParaRPr lang="en-US" dirty="0"/>
           </a:p>
@@ -3433,7 +3446,7 @@
           <a:p>
             <a:fld id="{EB712588-04B1-427B-82EE-E8DB90309F08}" type="datetimeFigureOut">
               <a:rPr lang="en-US" dirty="0"/>
-              <a:t>4/27/2021</a:t>
+              <a:t>5/17/2021</a:t>
             </a:fld>
             <a:endParaRPr lang="en-US" dirty="0"/>
           </a:p>
@@ -3803,7 +3816,7 @@
             <a:fld id="{B61BEF0D-F0BB-DE4B-95CE-6DB70DBA9567}" type="datetimeFigureOut">
               <a:rPr lang="en-US" dirty="0"/>
               <a:pPr/>
-              <a:t>4/27/2021</a:t>
+              <a:t>5/17/2021</a:t>
             </a:fld>
             <a:endParaRPr lang="en-US" dirty="0"/>
           </a:p>
@@ -3923,7 +3936,7 @@
             <a:fld id="{B61BEF0D-F0BB-DE4B-95CE-6DB70DBA9567}" type="datetimeFigureOut">
               <a:rPr lang="en-US" dirty="0"/>
               <a:pPr/>
-              <a:t>4/27/2021</a:t>
+              <a:t>5/17/2021</a:t>
             </a:fld>
             <a:endParaRPr lang="en-US" dirty="0"/>
           </a:p>
@@ -4015,7 +4028,7 @@
             <a:fld id="{B61BEF0D-F0BB-DE4B-95CE-6DB70DBA9567}" type="datetimeFigureOut">
               <a:rPr lang="en-US" dirty="0"/>
               <a:pPr/>
-              <a:t>4/27/2021</a:t>
+              <a:t>5/17/2021</a:t>
             </a:fld>
             <a:endParaRPr lang="en-US" dirty="0"/>
           </a:p>
@@ -4266,7 +4279,7 @@
           <a:p>
             <a:fld id="{42A54C80-263E-416B-A8E0-580EDEADCBDC}" type="datetimeFigureOut">
               <a:rPr lang="en-US" dirty="0"/>
-              <a:t>4/27/2021</a:t>
+              <a:t>5/17/2021</a:t>
             </a:fld>
             <a:endParaRPr lang="en-US" dirty="0"/>
           </a:p>
@@ -4525,7 +4538,7 @@
             <a:fld id="{B61BEF0D-F0BB-DE4B-95CE-6DB70DBA9567}" type="datetimeFigureOut">
               <a:rPr lang="en-US" dirty="0"/>
               <a:pPr/>
-              <a:t>4/27/2021</a:t>
+              <a:t>5/17/2021</a:t>
             </a:fld>
             <a:endParaRPr lang="en-US" dirty="0"/>
           </a:p>
@@ -5265,7 +5278,7 @@
             <a:fld id="{B61BEF0D-F0BB-DE4B-95CE-6DB70DBA9567}" type="datetimeFigureOut">
               <a:rPr lang="en-US" dirty="0"/>
               <a:pPr/>
-              <a:t>4/27/2021</a:t>
+              <a:t>5/17/2021</a:t>
             </a:fld>
             <a:endParaRPr lang="en-US" dirty="0"/>
           </a:p>
@@ -7535,15 +7548,7 @@
                     <a:schemeClr val="tx1"/>
                   </a:solidFill>
                 </a:rPr>
-                <a:t>..</a:t>
-              </a:r>
-              <a:r>
-                <a:rPr lang="en-US" dirty="0" smtClean="0">
-                  <a:solidFill>
-                    <a:schemeClr val="tx1"/>
-                  </a:solidFill>
-                </a:rPr>
-                <a:t>.</a:t>
+                <a:t>...</a:t>
               </a:r>
               <a:endParaRPr lang="en-US" dirty="0">
                 <a:solidFill>
@@ -10152,15 +10157,7 @@
                     <a:schemeClr val="tx1"/>
                   </a:solidFill>
                 </a:rPr>
-                <a:t>..</a:t>
-              </a:r>
-              <a:r>
-                <a:rPr lang="en-US" dirty="0" smtClean="0">
-                  <a:solidFill>
-                    <a:schemeClr val="tx1"/>
-                  </a:solidFill>
-                </a:rPr>
-                <a:t>.</a:t>
+                <a:t>...</a:t>
               </a:r>
               <a:endParaRPr lang="en-US" dirty="0">
                 <a:solidFill>
@@ -10404,6 +10401,443 @@
           <a:lstStyle/>
           <a:p>
             <a:r>
+              <a:rPr lang="fr-CA" dirty="0"/>
+              <a:t>Pattern-</a:t>
+            </a:r>
+            <a:r>
+              <a:rPr lang="fr-CA" dirty="0" err="1"/>
+              <a:t>oriented</a:t>
+            </a:r>
+            <a:r>
+              <a:rPr lang="fr-CA" dirty="0"/>
+              <a:t> </a:t>
+            </a:r>
+            <a:r>
+              <a:rPr lang="fr-CA" dirty="0" err="1"/>
+              <a:t>modelling</a:t>
+            </a:r>
+            <a:r>
+              <a:rPr lang="fr-CA" dirty="0"/>
+              <a:t> (POM)</a:t>
+            </a:r>
+          </a:p>
+        </p:txBody>
+      </p:sp>
+      <p:sp>
+        <p:nvSpPr>
+          <p:cNvPr id="3" name="Espace réservé du contenu 2"/>
+          <p:cNvSpPr>
+            <a:spLocks noGrp="1"/>
+          </p:cNvSpPr>
+          <p:nvPr>
+            <p:ph idx="1"/>
+          </p:nvPr>
+        </p:nvSpPr>
+        <p:spPr>
+          <a:xfrm>
+            <a:off x="677334" y="1623527"/>
+            <a:ext cx="8596668" cy="4417835"/>
+          </a:xfrm>
+        </p:spPr>
+        <p:txBody>
+          <a:bodyPr/>
+          <a:lstStyle/>
+          <a:p>
+            <a:r>
+              <a:rPr lang="en-US" dirty="0" smtClean="0"/>
+              <a:t>“POM </a:t>
+            </a:r>
+            <a:r>
+              <a:rPr lang="en-US" dirty="0"/>
+              <a:t>is a strategy for confronting models with empirical </a:t>
+            </a:r>
+            <a:r>
+              <a:rPr lang="en-US" dirty="0" smtClean="0"/>
+              <a:t>patterns … that can </a:t>
+            </a:r>
+            <a:r>
+              <a:rPr lang="en-US" dirty="0"/>
+              <a:t>be used to balance the level of model complexity and increase the chance </a:t>
+            </a:r>
+            <a:r>
+              <a:rPr lang="en-US" dirty="0" smtClean="0"/>
+              <a:t>of capturing </a:t>
+            </a:r>
+            <a:r>
+              <a:rPr lang="en-US" dirty="0"/>
+              <a:t>the processes in the system </a:t>
+            </a:r>
+            <a:r>
+              <a:rPr lang="en-US" dirty="0" smtClean="0"/>
+              <a:t>…”</a:t>
+            </a:r>
+          </a:p>
+          <a:p>
+            <a:r>
+              <a:rPr lang="en-US" dirty="0" smtClean="0"/>
+              <a:t>“… filters for </a:t>
+            </a:r>
+          </a:p>
+          <a:p>
+            <a:pPr lvl="1"/>
+            <a:r>
+              <a:rPr lang="en-US" dirty="0" smtClean="0"/>
+              <a:t>selecting variables</a:t>
+            </a:r>
+          </a:p>
+          <a:p>
+            <a:pPr lvl="1"/>
+            <a:r>
+              <a:rPr lang="en-US" dirty="0" smtClean="0"/>
+              <a:t>designing </a:t>
+            </a:r>
+            <a:r>
+              <a:rPr lang="en-US" dirty="0" err="1" smtClean="0"/>
+              <a:t>submodels</a:t>
+            </a:r>
+            <a:r>
+              <a:rPr lang="en-US" dirty="0" smtClean="0"/>
+              <a:t> </a:t>
+            </a:r>
+          </a:p>
+          <a:p>
+            <a:pPr lvl="1"/>
+            <a:r>
+              <a:rPr lang="en-US" dirty="0" err="1" smtClean="0"/>
+              <a:t>parameterising</a:t>
+            </a:r>
+            <a:r>
+              <a:rPr lang="en-US" dirty="0" smtClean="0"/>
+              <a:t> and </a:t>
+            </a:r>
+            <a:r>
+              <a:rPr lang="en-US" dirty="0" err="1" smtClean="0"/>
+              <a:t>optimising</a:t>
+            </a:r>
+            <a:r>
+              <a:rPr lang="en-US" dirty="0" smtClean="0"/>
+              <a:t> models ”</a:t>
+            </a:r>
+            <a:endParaRPr lang="fr-CA" dirty="0"/>
+          </a:p>
+        </p:txBody>
+      </p:sp>
+      <p:sp>
+        <p:nvSpPr>
+          <p:cNvPr id="4" name="ZoneTexte 3"/>
+          <p:cNvSpPr txBox="1"/>
+          <p:nvPr/>
+        </p:nvSpPr>
+        <p:spPr>
+          <a:xfrm>
+            <a:off x="8233610" y="5723124"/>
+            <a:ext cx="3685335" cy="923330"/>
+          </a:xfrm>
+          <a:prstGeom prst="rect">
+            <a:avLst/>
+          </a:prstGeom>
+          <a:noFill/>
+        </p:spPr>
+        <p:txBody>
+          <a:bodyPr wrap="square" rtlCol="0">
+            <a:spAutoFit/>
+          </a:bodyPr>
+          <a:lstStyle/>
+          <a:p>
+            <a:pPr algn="r"/>
+            <a:r>
+              <a:rPr lang="nl-NL" dirty="0" err="1" smtClean="0">
+                <a:latin typeface="Times New Roman" panose="02020603050405020304" pitchFamily="18" charset="0"/>
+                <a:cs typeface="Times New Roman" panose="02020603050405020304" pitchFamily="18" charset="0"/>
+              </a:rPr>
+              <a:t>Grimm</a:t>
+            </a:r>
+            <a:r>
+              <a:rPr lang="nl-NL" dirty="0" smtClean="0">
+                <a:latin typeface="Times New Roman" panose="02020603050405020304" pitchFamily="18" charset="0"/>
+                <a:cs typeface="Times New Roman" panose="02020603050405020304" pitchFamily="18" charset="0"/>
+              </a:rPr>
+              <a:t> </a:t>
+            </a:r>
+            <a:r>
+              <a:rPr lang="nl-NL" dirty="0" err="1" smtClean="0">
+                <a:latin typeface="Times New Roman" panose="02020603050405020304" pitchFamily="18" charset="0"/>
+                <a:cs typeface="Times New Roman" panose="02020603050405020304" pitchFamily="18" charset="0"/>
+              </a:rPr>
+              <a:t>and</a:t>
+            </a:r>
+            <a:r>
+              <a:rPr lang="nl-NL" dirty="0" smtClean="0">
+                <a:latin typeface="Times New Roman" panose="02020603050405020304" pitchFamily="18" charset="0"/>
+                <a:cs typeface="Times New Roman" panose="02020603050405020304" pitchFamily="18" charset="0"/>
+              </a:rPr>
+              <a:t> </a:t>
+            </a:r>
+            <a:r>
+              <a:rPr lang="nl-NL" dirty="0" err="1" smtClean="0">
+                <a:latin typeface="Times New Roman" panose="02020603050405020304" pitchFamily="18" charset="0"/>
+                <a:cs typeface="Times New Roman" panose="02020603050405020304" pitchFamily="18" charset="0"/>
+              </a:rPr>
+              <a:t>Railsback</a:t>
+            </a:r>
+            <a:r>
+              <a:rPr lang="nl-NL" dirty="0" smtClean="0">
+                <a:latin typeface="Times New Roman" panose="02020603050405020304" pitchFamily="18" charset="0"/>
+                <a:cs typeface="Times New Roman" panose="02020603050405020304" pitchFamily="18" charset="0"/>
+              </a:rPr>
+              <a:t>, 2012</a:t>
+            </a:r>
+          </a:p>
+          <a:p>
+            <a:pPr algn="r"/>
+            <a:r>
+              <a:rPr lang="nl-NL" dirty="0" err="1" smtClean="0">
+                <a:latin typeface="Times New Roman" panose="02020603050405020304" pitchFamily="18" charset="0"/>
+                <a:cs typeface="Times New Roman" panose="02020603050405020304" pitchFamily="18" charset="0"/>
+              </a:rPr>
+              <a:t>Grimm</a:t>
+            </a:r>
+            <a:r>
+              <a:rPr lang="nl-NL" dirty="0" smtClean="0">
+                <a:latin typeface="Times New Roman" panose="02020603050405020304" pitchFamily="18" charset="0"/>
+                <a:cs typeface="Times New Roman" panose="02020603050405020304" pitchFamily="18" charset="0"/>
+              </a:rPr>
+              <a:t> et al., 2017</a:t>
+            </a:r>
+          </a:p>
+          <a:p>
+            <a:pPr algn="r"/>
+            <a:r>
+              <a:rPr lang="nl-NL" dirty="0" smtClean="0">
+                <a:latin typeface="Times New Roman" panose="02020603050405020304" pitchFamily="18" charset="0"/>
+                <a:cs typeface="Times New Roman" panose="02020603050405020304" pitchFamily="18" charset="0"/>
+              </a:rPr>
+              <a:t>Gallagher et al., 2021</a:t>
+            </a:r>
+            <a:endParaRPr lang="fr-FR" dirty="0">
+              <a:latin typeface="Times New Roman" panose="02020603050405020304" pitchFamily="18" charset="0"/>
+              <a:cs typeface="Times New Roman" panose="02020603050405020304" pitchFamily="18" charset="0"/>
+            </a:endParaRPr>
+          </a:p>
+        </p:txBody>
+      </p:sp>
+    </p:spTree>
+    <p:extLst>
+      <p:ext uri="{BB962C8B-B14F-4D97-AF65-F5344CB8AC3E}">
+        <p14:creationId xmlns:p14="http://schemas.microsoft.com/office/powerpoint/2010/main" val="2442395117"/>
+      </p:ext>
+    </p:extLst>
+  </p:cSld>
+  <p:clrMapOvr>
+    <a:masterClrMapping/>
+  </p:clrMapOvr>
+</p:sld>
+</file>
+
+<file path=ppt/slides/slide14.xml><?xml version="1.0" encoding="utf-8"?>
+<p:sld xmlns:a="http://schemas.openxmlformats.org/drawingml/2006/main" xmlns:r="http://schemas.openxmlformats.org/officeDocument/2006/relationships" xmlns:p="http://schemas.openxmlformats.org/presentationml/2006/main">
+  <p:cSld>
+    <p:spTree>
+      <p:nvGrpSpPr>
+        <p:cNvPr id="1" name=""/>
+        <p:cNvGrpSpPr/>
+        <p:nvPr/>
+      </p:nvGrpSpPr>
+      <p:grpSpPr>
+        <a:xfrm>
+          <a:off x="0" y="0"/>
+          <a:ext cx="0" cy="0"/>
+          <a:chOff x="0" y="0"/>
+          <a:chExt cx="0" cy="0"/>
+        </a:xfrm>
+      </p:grpSpPr>
+      <p:sp>
+        <p:nvSpPr>
+          <p:cNvPr id="2" name="Titre 1"/>
+          <p:cNvSpPr>
+            <a:spLocks noGrp="1"/>
+          </p:cNvSpPr>
+          <p:nvPr>
+            <p:ph type="title"/>
+          </p:nvPr>
+        </p:nvSpPr>
+        <p:spPr>
+          <a:xfrm>
+            <a:off x="537272" y="205268"/>
+            <a:ext cx="8596668" cy="1320800"/>
+          </a:xfrm>
+        </p:spPr>
+        <p:txBody>
+          <a:bodyPr/>
+          <a:lstStyle/>
+          <a:p>
+            <a:r>
+              <a:rPr lang="fr-CA" dirty="0" smtClean="0"/>
+              <a:t>Pattern </a:t>
+            </a:r>
+            <a:r>
+              <a:rPr lang="fr-CA" dirty="0" err="1" smtClean="0"/>
+              <a:t>examples</a:t>
+            </a:r>
+            <a:endParaRPr lang="fr-CA" dirty="0"/>
+          </a:p>
+        </p:txBody>
+      </p:sp>
+      <p:sp>
+        <p:nvSpPr>
+          <p:cNvPr id="3" name="Espace réservé du contenu 2"/>
+          <p:cNvSpPr>
+            <a:spLocks noGrp="1"/>
+          </p:cNvSpPr>
+          <p:nvPr>
+            <p:ph idx="1"/>
+          </p:nvPr>
+        </p:nvSpPr>
+        <p:spPr/>
+        <p:txBody>
+          <a:bodyPr/>
+          <a:lstStyle/>
+          <a:p>
+            <a:endParaRPr lang="fr-CA" dirty="0"/>
+          </a:p>
+        </p:txBody>
+      </p:sp>
+      <p:pic>
+        <p:nvPicPr>
+          <p:cNvPr id="4" name="Image 3"/>
+          <p:cNvPicPr>
+            <a:picLocks noChangeAspect="1"/>
+          </p:cNvPicPr>
+          <p:nvPr/>
+        </p:nvPicPr>
+        <p:blipFill rotWithShape="1">
+          <a:blip r:embed="rId2"/>
+          <a:srcRect b="52340"/>
+          <a:stretch/>
+        </p:blipFill>
+        <p:spPr>
+          <a:xfrm>
+            <a:off x="161072" y="1052367"/>
+            <a:ext cx="5850294" cy="5412782"/>
+          </a:xfrm>
+          <a:prstGeom prst="rect">
+            <a:avLst/>
+          </a:prstGeom>
+        </p:spPr>
+      </p:pic>
+      <p:pic>
+        <p:nvPicPr>
+          <p:cNvPr id="5" name="Image 4"/>
+          <p:cNvPicPr>
+            <a:picLocks noChangeAspect="1"/>
+          </p:cNvPicPr>
+          <p:nvPr/>
+        </p:nvPicPr>
+        <p:blipFill rotWithShape="1">
+          <a:blip r:embed="rId2"/>
+          <a:srcRect t="47546"/>
+          <a:stretch/>
+        </p:blipFill>
+        <p:spPr>
+          <a:xfrm>
+            <a:off x="6173342" y="215152"/>
+            <a:ext cx="5921197" cy="6029545"/>
+          </a:xfrm>
+          <a:prstGeom prst="rect">
+            <a:avLst/>
+          </a:prstGeom>
+        </p:spPr>
+      </p:pic>
+      <p:sp>
+        <p:nvSpPr>
+          <p:cNvPr id="6" name="ZoneTexte 5"/>
+          <p:cNvSpPr txBox="1"/>
+          <p:nvPr/>
+        </p:nvSpPr>
+        <p:spPr>
+          <a:xfrm>
+            <a:off x="8401561" y="6375332"/>
+            <a:ext cx="3685335" cy="369332"/>
+          </a:xfrm>
+          <a:prstGeom prst="rect">
+            <a:avLst/>
+          </a:prstGeom>
+          <a:noFill/>
+        </p:spPr>
+        <p:txBody>
+          <a:bodyPr wrap="square" rtlCol="0">
+            <a:spAutoFit/>
+          </a:bodyPr>
+          <a:lstStyle/>
+          <a:p>
+            <a:pPr algn="r"/>
+            <a:r>
+              <a:rPr lang="nl-NL" dirty="0" smtClean="0">
+                <a:latin typeface="Times New Roman" panose="02020603050405020304" pitchFamily="18" charset="0"/>
+                <a:cs typeface="Times New Roman" panose="02020603050405020304" pitchFamily="18" charset="0"/>
+              </a:rPr>
+              <a:t>Gallagher et al., 2021</a:t>
+            </a:r>
+            <a:endParaRPr lang="fr-FR" dirty="0">
+              <a:latin typeface="Times New Roman" panose="02020603050405020304" pitchFamily="18" charset="0"/>
+              <a:cs typeface="Times New Roman" panose="02020603050405020304" pitchFamily="18" charset="0"/>
+            </a:endParaRPr>
+          </a:p>
+        </p:txBody>
+      </p:sp>
+    </p:spTree>
+    <p:extLst>
+      <p:ext uri="{BB962C8B-B14F-4D97-AF65-F5344CB8AC3E}">
+        <p14:creationId xmlns:p14="http://schemas.microsoft.com/office/powerpoint/2010/main" val="2620246536"/>
+      </p:ext>
+    </p:extLst>
+  </p:cSld>
+  <p:clrMapOvr>
+    <a:masterClrMapping/>
+  </p:clrMapOvr>
+  <p:timing>
+    <p:tnLst>
+      <p:par>
+        <p:cTn id="1" dur="indefinite" restart="never" nodeType="tmRoot"/>
+      </p:par>
+    </p:tnLst>
+  </p:timing>
+</p:sld>
+</file>
+
+<file path=ppt/slides/slide15.xml><?xml version="1.0" encoding="utf-8"?>
+<p:sld xmlns:a="http://schemas.openxmlformats.org/drawingml/2006/main" xmlns:r="http://schemas.openxmlformats.org/officeDocument/2006/relationships" xmlns:p="http://schemas.openxmlformats.org/presentationml/2006/main">
+  <p:cSld>
+    <p:spTree>
+      <p:nvGrpSpPr>
+        <p:cNvPr id="1" name=""/>
+        <p:cNvGrpSpPr/>
+        <p:nvPr/>
+      </p:nvGrpSpPr>
+      <p:grpSpPr>
+        <a:xfrm>
+          <a:off x="0" y="0"/>
+          <a:ext cx="0" cy="0"/>
+          <a:chOff x="0" y="0"/>
+          <a:chExt cx="0" cy="0"/>
+        </a:xfrm>
+      </p:grpSpPr>
+      <p:sp>
+        <p:nvSpPr>
+          <p:cNvPr id="2" name="Titre 1"/>
+          <p:cNvSpPr>
+            <a:spLocks noGrp="1"/>
+          </p:cNvSpPr>
+          <p:nvPr>
+            <p:ph type="title"/>
+          </p:nvPr>
+        </p:nvSpPr>
+        <p:spPr/>
+        <p:txBody>
+          <a:bodyPr/>
+          <a:lstStyle/>
+          <a:p>
+            <a:r>
               <a:rPr lang="fr-CA" dirty="0" err="1" smtClean="0"/>
               <a:t>Difficulties</a:t>
             </a:r>
@@ -10427,8 +10861,8 @@
         </p:nvSpPr>
         <p:spPr>
           <a:xfrm>
-            <a:off x="677334" y="1743341"/>
-            <a:ext cx="9030688" cy="4298021"/>
+            <a:off x="677333" y="1520891"/>
+            <a:ext cx="9511695" cy="5038530"/>
           </a:xfrm>
         </p:spPr>
         <p:txBody>
@@ -10457,8 +10891,15 @@
             </a:r>
             <a:r>
               <a:rPr lang="fr-CA" dirty="0" smtClean="0"/>
-              <a:t> model</a:t>
-            </a:r>
+              <a:t> </a:t>
+            </a:r>
+            <a:r>
+              <a:rPr lang="fr-CA" dirty="0" smtClean="0"/>
+              <a:t>model</a:t>
+            </a:r>
+          </a:p>
+          <a:p>
+            <a:endParaRPr lang="fr-CA" dirty="0" smtClean="0"/>
           </a:p>
           <a:p>
             <a:r>
@@ -10517,57 +10958,94 @@
             <a:pPr lvl="1"/>
             <a:r>
               <a:rPr lang="en-CA" dirty="0" smtClean="0"/>
-              <a:t>2 parameters, 10 values per parameter to test =&gt; 10*10 sets of simulations</a:t>
-            </a:r>
-          </a:p>
-          <a:p>
+              <a:t>2 parameters, 10 values per parameter to test =&gt; 10*10 sets of </a:t>
+            </a:r>
             <a:r>
               <a:rPr lang="en-CA" dirty="0" smtClean="0"/>
-              <a:t>Need multiple measurable and comparable outputs (“patterns”)</a:t>
+              <a:t>simulations</a:t>
             </a:r>
           </a:p>
           <a:p>
             <a:pPr lvl="1"/>
+            <a:endParaRPr lang="en-CA" dirty="0" smtClean="0"/>
+          </a:p>
+          <a:p>
             <a:r>
               <a:rPr lang="en-CA" dirty="0" smtClean="0"/>
-              <a:t>E.g., distribution of walked distances, mean litter size, kernel density</a:t>
+              <a:t>Need multiple measurable and comparable outputs (“patterns”)</a:t>
             </a:r>
           </a:p>
           <a:p>
             <a:pPr lvl="1"/>
             <a:r>
+              <a:rPr lang="en-CA" dirty="0"/>
+              <a:t>More patterns to meet =&gt; better calibration of the parameters</a:t>
+            </a:r>
+          </a:p>
+          <a:p>
+            <a:r>
               <a:rPr lang="en-CA" dirty="0" smtClean="0"/>
-              <a:t>Two methods</a:t>
-            </a:r>
+              <a:t>Two </a:t>
+            </a:r>
+            <a:r>
+              <a:rPr lang="en-CA" dirty="0" smtClean="0"/>
+              <a:t>methods</a:t>
+            </a:r>
+          </a:p>
+          <a:p>
+            <a:pPr lvl="1"/>
+            <a:r>
+              <a:rPr lang="en-CA" dirty="0" smtClean="0"/>
+              <a:t>Pattern reproduced: keep or reject the model </a:t>
+            </a:r>
+            <a:endParaRPr lang="en-CA" dirty="0" smtClean="0"/>
           </a:p>
           <a:p>
             <a:pPr lvl="2"/>
             <a:r>
               <a:rPr lang="en-CA" dirty="0" smtClean="0"/>
-              <a:t>Pattern reproduced: keep or reject the model (need to define a threshold)</a:t>
+              <a:t>N</a:t>
+            </a:r>
+            <a:r>
+              <a:rPr lang="en-CA" dirty="0" smtClean="0"/>
+              <a:t>eed </a:t>
+            </a:r>
+            <a:r>
+              <a:rPr lang="en-CA" dirty="0" smtClean="0"/>
+              <a:t>to define a </a:t>
+            </a:r>
+            <a:r>
+              <a:rPr lang="en-CA" dirty="0" smtClean="0"/>
+              <a:t>threshold</a:t>
+            </a:r>
+            <a:endParaRPr lang="en-CA" dirty="0" smtClean="0"/>
+          </a:p>
+          <a:p>
+            <a:pPr lvl="1"/>
+            <a:r>
+              <a:rPr lang="en-CA" dirty="0" smtClean="0"/>
+              <a:t>Select the model best reproducing the </a:t>
+            </a:r>
+            <a:r>
+              <a:rPr lang="en-CA" dirty="0" smtClean="0"/>
+              <a:t>pattern</a:t>
             </a:r>
           </a:p>
           <a:p>
             <a:pPr lvl="2"/>
             <a:r>
               <a:rPr lang="en-CA" dirty="0" smtClean="0"/>
-              <a:t>Select the model best reproducing the pattern (but there is always </a:t>
-            </a:r>
-            <a:r>
-              <a:rPr lang="en-CA" smtClean="0"/>
-              <a:t>a best one </a:t>
+              <a:t>But </a:t>
             </a:r>
             <a:r>
               <a:rPr lang="en-CA" dirty="0" smtClean="0"/>
-              <a:t>among bad ones)</a:t>
-            </a:r>
-          </a:p>
-          <a:p>
-            <a:pPr lvl="1"/>
+              <a:t>there is always a best one among bad </a:t>
+            </a:r>
             <a:r>
               <a:rPr lang="en-CA" dirty="0" smtClean="0"/>
-              <a:t>More patterns to meet =&gt; better calibration of the parameters</a:t>
-            </a:r>
+              <a:t>ones</a:t>
+            </a:r>
+            <a:endParaRPr lang="en-CA" dirty="0" smtClean="0"/>
           </a:p>
           <a:p>
             <a:pPr lvl="1"/>
@@ -10670,7 +11148,7 @@
                                         <p:tgtEl>
                                           <p:spTgt spid="3">
                                             <p:txEl>
-                                              <p:pRg st="1" end="1"/>
+                                              <p:pRg st="2" end="2"/>
                                             </p:txEl>
                                           </p:spTgt>
                                         </p:tgtEl>
@@ -10701,7 +11179,7 @@
                                         <p:tgtEl>
                                           <p:spTgt spid="3">
                                             <p:txEl>
-                                              <p:pRg st="2" end="2"/>
+                                              <p:pRg st="3" end="3"/>
                                             </p:txEl>
                                           </p:spTgt>
                                         </p:tgtEl>
@@ -10732,7 +11210,7 @@
                                         <p:tgtEl>
                                           <p:spTgt spid="3">
                                             <p:txEl>
-                                              <p:pRg st="3" end="3"/>
+                                              <p:pRg st="4" end="4"/>
                                             </p:txEl>
                                           </p:spTgt>
                                         </p:tgtEl>
@@ -10781,7 +11259,7 @@
                                         <p:tgtEl>
                                           <p:spTgt spid="3">
                                             <p:txEl>
-                                              <p:pRg st="4" end="4"/>
+                                              <p:pRg st="6" end="6"/>
                                             </p:txEl>
                                           </p:spTgt>
                                         </p:tgtEl>
@@ -10812,7 +11290,7 @@
                                         <p:tgtEl>
                                           <p:spTgt spid="3">
                                             <p:txEl>
-                                              <p:pRg st="5" end="5"/>
+                                              <p:pRg st="8" end="8"/>
                                             </p:txEl>
                                           </p:spTgt>
                                         </p:tgtEl>
@@ -10843,7 +11321,7 @@
                                         <p:tgtEl>
                                           <p:spTgt spid="3">
                                             <p:txEl>
-                                              <p:pRg st="6" end="6"/>
+                                              <p:pRg st="7" end="7"/>
                                             </p:txEl>
                                           </p:spTgt>
                                         </p:tgtEl>
@@ -10874,7 +11352,7 @@
                                         <p:tgtEl>
                                           <p:spTgt spid="3">
                                             <p:txEl>
-                                              <p:pRg st="7" end="7"/>
+                                              <p:pRg st="9" end="9"/>
                                             </p:txEl>
                                           </p:spTgt>
                                         </p:tgtEl>
@@ -10905,7 +11383,7 @@
                                         <p:tgtEl>
                                           <p:spTgt spid="3">
                                             <p:txEl>
-                                              <p:pRg st="8" end="8"/>
+                                              <p:pRg st="10" end="10"/>
                                             </p:txEl>
                                           </p:spTgt>
                                         </p:tgtEl>
@@ -10936,7 +11414,38 @@
                                         <p:tgtEl>
                                           <p:spTgt spid="3">
                                             <p:txEl>
-                                              <p:pRg st="9" end="9"/>
+                                              <p:pRg st="11" end="11"/>
+                                            </p:txEl>
+                                          </p:spTgt>
+                                        </p:tgtEl>
+                                        <p:attrNameLst>
+                                          <p:attrName>style.visibility</p:attrName>
+                                        </p:attrNameLst>
+                                      </p:cBhvr>
+                                      <p:to>
+                                        <p:strVal val="visible"/>
+                                      </p:to>
+                                    </p:set>
+                                  </p:childTnLst>
+                                </p:cTn>
+                              </p:par>
+                              <p:par>
+                                <p:cTn id="29" presetID="1" presetClass="entr" presetSubtype="0" fill="hold" nodeType="withEffect">
+                                  <p:stCondLst>
+                                    <p:cond delay="0"/>
+                                  </p:stCondLst>
+                                  <p:childTnLst>
+                                    <p:set>
+                                      <p:cBhvr>
+                                        <p:cTn id="30" dur="1" fill="hold">
+                                          <p:stCondLst>
+                                            <p:cond delay="0"/>
+                                          </p:stCondLst>
+                                        </p:cTn>
+                                        <p:tgtEl>
+                                          <p:spTgt spid="3">
+                                            <p:txEl>
+                                              <p:pRg st="12" end="12"/>
                                             </p:txEl>
                                           </p:spTgt>
                                         </p:tgtEl>
@@ -10982,7 +11491,7 @@
 </p:sld>
 </file>
 
-<file path=ppt/slides/slide14.xml><?xml version="1.0" encoding="utf-8"?>
+<file path=ppt/slides/slide16.xml><?xml version="1.0" encoding="utf-8"?>
 <p:sld xmlns:a="http://schemas.openxmlformats.org/drawingml/2006/main" xmlns:r="http://schemas.openxmlformats.org/officeDocument/2006/relationships" xmlns:p="http://schemas.openxmlformats.org/presentationml/2006/main">
   <p:cSld>
     <p:spTree>
@@ -11061,8 +11570,116 @@
               </a:spcBef>
             </a:pPr>
             <a:r>
-              <a:rPr lang="pt-BR" dirty="0"/>
-              <a:t>Grimm V, Revilla E, Berger U, Jeltsch F, Mooij WM, Railsback SF, Thulke H-H, Weiner J, Wiegand T, DeAngelis DL. 2005. Pattern-oriented modeling of agent-based complex systems: lessons from ecology. Science 310:987–991. </a:t>
+              <a:rPr lang="fr-CA" dirty="0" err="1"/>
+              <a:t>Gallagher</a:t>
+            </a:r>
+            <a:r>
+              <a:rPr lang="fr-CA" dirty="0"/>
+              <a:t> CA, </a:t>
+            </a:r>
+            <a:r>
+              <a:rPr lang="fr-CA" dirty="0" err="1"/>
+              <a:t>Chudzinska</a:t>
+            </a:r>
+            <a:r>
+              <a:rPr lang="fr-CA" dirty="0"/>
+              <a:t> M, Larsen-gray A, Pollock CJ, </a:t>
+            </a:r>
+            <a:r>
+              <a:rPr lang="fr-CA" dirty="0" err="1"/>
+              <a:t>Sells</a:t>
+            </a:r>
+            <a:r>
+              <a:rPr lang="fr-CA" dirty="0"/>
+              <a:t> SN, White PJC, Berger U. 2021. </a:t>
+            </a:r>
+            <a:r>
+              <a:rPr lang="fr-CA" dirty="0" err="1"/>
+              <a:t>From</a:t>
+            </a:r>
+            <a:r>
+              <a:rPr lang="fr-CA" dirty="0"/>
+              <a:t> </a:t>
+            </a:r>
+            <a:r>
+              <a:rPr lang="fr-CA" dirty="0" err="1"/>
+              <a:t>theory</a:t>
+            </a:r>
+            <a:r>
+              <a:rPr lang="fr-CA" dirty="0"/>
+              <a:t> to practice in pattern-</a:t>
+            </a:r>
+            <a:r>
+              <a:rPr lang="fr-CA" dirty="0" err="1"/>
+              <a:t>oriented</a:t>
+            </a:r>
+            <a:r>
+              <a:rPr lang="fr-CA" dirty="0"/>
+              <a:t> </a:t>
+            </a:r>
+            <a:r>
+              <a:rPr lang="fr-CA" dirty="0" err="1"/>
+              <a:t>modelling</a:t>
+            </a:r>
+            <a:r>
+              <a:rPr lang="fr-CA" dirty="0"/>
+              <a:t>: </a:t>
+            </a:r>
+            <a:r>
+              <a:rPr lang="fr-CA" dirty="0" err="1"/>
+              <a:t>identifying</a:t>
+            </a:r>
+            <a:r>
+              <a:rPr lang="fr-CA" dirty="0"/>
+              <a:t> and </a:t>
+            </a:r>
+            <a:r>
+              <a:rPr lang="fr-CA" dirty="0" err="1"/>
+              <a:t>using</a:t>
+            </a:r>
+            <a:r>
+              <a:rPr lang="fr-CA" dirty="0"/>
+              <a:t> </a:t>
+            </a:r>
+            <a:r>
+              <a:rPr lang="fr-CA" dirty="0" err="1"/>
+              <a:t>empirical</a:t>
+            </a:r>
+            <a:r>
+              <a:rPr lang="fr-CA" dirty="0"/>
+              <a:t> patterns in </a:t>
+            </a:r>
+            <a:r>
+              <a:rPr lang="fr-CA" dirty="0" err="1"/>
+              <a:t>predictive</a:t>
+            </a:r>
+            <a:r>
+              <a:rPr lang="fr-CA" dirty="0"/>
+              <a:t> </a:t>
+            </a:r>
+            <a:r>
+              <a:rPr lang="fr-CA" dirty="0" err="1"/>
+              <a:t>models</a:t>
+            </a:r>
+            <a:r>
+              <a:rPr lang="fr-CA" dirty="0"/>
+              <a:t>. </a:t>
+            </a:r>
+            <a:r>
+              <a:rPr lang="fr-CA" dirty="0" err="1"/>
+              <a:t>Biological</a:t>
+            </a:r>
+            <a:r>
+              <a:rPr lang="fr-CA" dirty="0"/>
+              <a:t> </a:t>
+            </a:r>
+            <a:r>
+              <a:rPr lang="fr-CA" dirty="0" err="1"/>
+              <a:t>Reviews</a:t>
+            </a:r>
+            <a:r>
+              <a:rPr lang="fr-CA" dirty="0"/>
+              <a:t>.</a:t>
             </a:r>
           </a:p>
           <a:p>
@@ -11072,9 +11689,69 @@
               </a:spcBef>
             </a:pPr>
             <a:r>
+              <a:rPr lang="pt-BR" dirty="0" smtClean="0"/>
+              <a:t>Grimm </a:t>
+            </a:r>
+            <a:r>
+              <a:rPr lang="pt-BR" dirty="0"/>
+              <a:t>V, Revilla E, Berger U, Jeltsch F, Mooij WM, Railsback SF, Thulke H-H, Weiner J, Wiegand T, DeAngelis DL. 2005. Pattern-oriented modeling of agent-based complex systems: lessons from ecology. Science 310:987–991. </a:t>
+            </a:r>
+          </a:p>
+          <a:p>
+            <a:pPr>
+              <a:spcBef>
+                <a:spcPts val="0"/>
+              </a:spcBef>
+            </a:pPr>
+            <a:r>
               <a:rPr lang="pt-BR" dirty="0"/>
               <a:t>Grimm V, Railsback SF. 2012. Pattern-oriented modelling: a “multi-scope” for predictive systems ecology. Philosophical transactions of the Royal Society of London - Series B 367:298–310. </a:t>
             </a:r>
+            <a:endParaRPr lang="pt-BR" dirty="0" smtClean="0"/>
+          </a:p>
+          <a:p>
+            <a:pPr>
+              <a:spcBef>
+                <a:spcPts val="0"/>
+              </a:spcBef>
+            </a:pPr>
+            <a:r>
+              <a:rPr lang="en-US" dirty="0" smtClean="0"/>
+              <a:t>Grimm V, </a:t>
+            </a:r>
+            <a:r>
+              <a:rPr lang="en-US" dirty="0" err="1" smtClean="0"/>
+              <a:t>Ayllon</a:t>
+            </a:r>
+            <a:r>
+              <a:rPr lang="en-US" dirty="0" smtClean="0"/>
+              <a:t> D, </a:t>
+            </a:r>
+            <a:r>
+              <a:rPr lang="en-US" dirty="0" err="1" smtClean="0"/>
+              <a:t>Railsback</a:t>
+            </a:r>
+            <a:r>
+              <a:rPr lang="en-US" dirty="0" smtClean="0"/>
+              <a:t> SF</a:t>
+            </a:r>
+            <a:r>
+              <a:rPr lang="en-US" dirty="0"/>
+              <a:t>. </a:t>
+            </a:r>
+            <a:r>
+              <a:rPr lang="en-US" dirty="0" smtClean="0"/>
+              <a:t>2017. </a:t>
+            </a:r>
+            <a:r>
+              <a:rPr lang="en-US" dirty="0"/>
+              <a:t>Next-generation individual-based models integrate biodiversity and ecosystems: yes we can, and yes we must. Ecosystems </a:t>
+            </a:r>
+            <a:r>
+              <a:rPr lang="en-US" dirty="0" smtClean="0"/>
+              <a:t>20:229–236.</a:t>
+            </a:r>
+            <a:endParaRPr lang="pt-BR" dirty="0"/>
           </a:p>
           <a:p>
             <a:pPr>
@@ -31775,15 +32452,7 @@
                     <a:schemeClr val="tx1"/>
                   </a:solidFill>
                 </a:rPr>
-                <a:t>..</a:t>
-              </a:r>
-              <a:r>
-                <a:rPr lang="en-US" dirty="0" smtClean="0">
-                  <a:solidFill>
-                    <a:schemeClr val="tx1"/>
-                  </a:solidFill>
-                </a:rPr>
-                <a:t>.</a:t>
+                <a:t>...</a:t>
               </a:r>
               <a:endParaRPr lang="en-US" dirty="0">
                 <a:solidFill>
@@ -32289,7 +32958,7 @@
   <a:extraClrSchemeLst/>
   <a:extLst>
     <a:ext uri="{05A4C25C-085E-4340-85A3-A5531E510DB2}">
-      <thm15:themeFamily xmlns:thm15="http://schemas.microsoft.com/office/thememl/2012/main" xmlns="" name="Facet" id="{C0C680CD-088A-49FC-A102-D699147F32B2}" vid="{CFBC31BA-B70F-4F30-BCAA-4F3011E16C4D}"/>
+      <thm15:themeFamily xmlns:thm15="http://schemas.microsoft.com/office/thememl/2012/main" name="Facet" id="{C0C680CD-088A-49FC-A102-D699147F32B2}" vid="{CFBC31BA-B70F-4F30-BCAA-4F3011E16C4D}"/>
     </a:ext>
   </a:extLst>
 </a:theme>

</xml_diff>